<commit_message>
Minor tweak to ASP.NET Core deck
</commit_message>
<xml_diff>
--- a/docs/2-ASP.NET-Core-and-Web-API/aspnetcore.pptx
+++ b/docs/2-ASP.NET-Core-and-Web-API/aspnetcore.pptx
@@ -33,8 +33,8 @@
     <p:sldId id="1707" r:id="rId24"/>
     <p:sldId id="1709" r:id="rId25"/>
     <p:sldId id="1710" r:id="rId26"/>
-    <p:sldId id="1712" r:id="rId27"/>
-    <p:sldId id="1711" r:id="rId28"/>
+    <p:sldId id="1711" r:id="rId27"/>
+    <p:sldId id="1712" r:id="rId28"/>
   </p:sldIdLst>
   <p:sldSz cx="12436475" cy="6994525"/>
   <p:notesSz cx="6858000" cy="9144000"/>
@@ -158,8 +158,8 @@
             <p14:sldId id="1707"/>
             <p14:sldId id="1709"/>
             <p14:sldId id="1710"/>
+            <p14:sldId id="1711"/>
             <p14:sldId id="1712"/>
-            <p14:sldId id="1711"/>
           </p14:sldIdLst>
         </p14:section>
       </p14:sectionLst>
@@ -291,7 +291,7 @@
               <a:rPr lang="en-US" smtClean="0">
                 <a:latin typeface="Segoe UI" pitchFamily="34" charset="0"/>
               </a:rPr>
-              <a:t>10/5/2017 9:03 AM</a:t>
+              <a:t>10/8/2017 6:04 PM</a:t>
             </a:fld>
             <a:endParaRPr lang="en-US" dirty="0">
               <a:latin typeface="Segoe UI" pitchFamily="34" charset="0"/>
@@ -572,7 +572,7 @@
           <a:p>
             <a:fld id="{38EEC551-8CDA-4EB6-89BB-2A86C9F091C8}" type="datetime8">
               <a:rPr lang="en-US" smtClean="0"/>
-              <a:t>10/5/2017 8:59 AM</a:t>
+              <a:t>10/8/2017 6:04 PM</a:t>
             </a:fld>
             <a:endParaRPr lang="en-US" dirty="0"/>
           </a:p>
@@ -989,7 +989,7 @@
           <a:p>
             <a:fld id="{38EEC551-8CDA-4EB6-89BB-2A86C9F091C8}" type="datetime8">
               <a:rPr lang="en-US" smtClean="0"/>
-              <a:t>10/5/2017 8:59 AM</a:t>
+              <a:t>10/8/2017 6:04 PM</a:t>
             </a:fld>
             <a:endParaRPr lang="en-US" dirty="0"/>
           </a:p>
@@ -1174,7 +1174,7 @@
           <a:p>
             <a:fld id="{38EEC551-8CDA-4EB6-89BB-2A86C9F091C8}" type="datetime8">
               <a:rPr lang="en-US" smtClean="0"/>
-              <a:t>10/5/2017 10:36 AM</a:t>
+              <a:t>10/8/2017 6:04 PM</a:t>
             </a:fld>
             <a:endParaRPr lang="en-US" dirty="0"/>
           </a:p>
@@ -1359,7 +1359,7 @@
           <a:p>
             <a:fld id="{38EEC551-8CDA-4EB6-89BB-2A86C9F091C8}" type="datetime8">
               <a:rPr lang="en-US" smtClean="0"/>
-              <a:t>10/5/2017 10:36 AM</a:t>
+              <a:t>10/8/2017 6:04 PM</a:t>
             </a:fld>
             <a:endParaRPr lang="en-US" dirty="0"/>
           </a:p>
@@ -1544,7 +1544,7 @@
           <a:p>
             <a:fld id="{38EEC551-8CDA-4EB6-89BB-2A86C9F091C8}" type="datetime8">
               <a:rPr lang="en-US" smtClean="0"/>
-              <a:t>10/5/2017 10:36 AM</a:t>
+              <a:t>10/8/2017 6:04 PM</a:t>
             </a:fld>
             <a:endParaRPr lang="en-US" dirty="0"/>
           </a:p>
@@ -1729,7 +1729,7 @@
           <a:p>
             <a:fld id="{38EEC551-8CDA-4EB6-89BB-2A86C9F091C8}" type="datetime8">
               <a:rPr lang="en-US" smtClean="0"/>
-              <a:t>10/5/2017 10:36 AM</a:t>
+              <a:t>10/8/2017 6:04 PM</a:t>
             </a:fld>
             <a:endParaRPr lang="en-US" dirty="0"/>
           </a:p>
@@ -2202,7 +2202,7 @@
           <a:p>
             <a:fld id="{38EEC551-8CDA-4EB6-89BB-2A86C9F091C8}" type="datetime8">
               <a:rPr lang="en-US" smtClean="0"/>
-              <a:t>10/5/2017 10:36 AM</a:t>
+              <a:t>10/8/2017 6:04 PM</a:t>
             </a:fld>
             <a:endParaRPr lang="en-US" dirty="0"/>
           </a:p>
@@ -2289,7 +2289,28 @@
           <a:bodyPr/>
           <a:lstStyle/>
           <a:p>
-            <a:endParaRPr lang="en-US"/>
+            <a:r>
+              <a:rPr lang="en-US" dirty="0"/>
+              <a:t>Developer exception middleware</a:t>
+            </a:r>
+          </a:p>
+          <a:p>
+            <a:r>
+              <a:rPr lang="en-US" dirty="0"/>
+              <a:t>Static files</a:t>
+            </a:r>
+          </a:p>
+          <a:p>
+            <a:r>
+              <a:rPr lang="en-US" dirty="0"/>
+              <a:t>Routing</a:t>
+            </a:r>
+          </a:p>
+          <a:p>
+            <a:r>
+              <a:rPr lang="en-US" dirty="0"/>
+              <a:t>Custom</a:t>
+            </a:r>
           </a:p>
         </p:txBody>
       </p:sp>
@@ -2387,7 +2408,7 @@
           <a:p>
             <a:fld id="{38EEC551-8CDA-4EB6-89BB-2A86C9F091C8}" type="datetime8">
               <a:rPr lang="en-US" smtClean="0"/>
-              <a:t>10/5/2017 10:36 AM</a:t>
+              <a:t>10/8/2017 6:04 PM</a:t>
             </a:fld>
             <a:endParaRPr lang="en-US" dirty="0"/>
           </a:p>
@@ -2572,7 +2593,7 @@
           <a:p>
             <a:fld id="{38EEC551-8CDA-4EB6-89BB-2A86C9F091C8}" type="datetime8">
               <a:rPr lang="en-US" smtClean="0"/>
-              <a:t>10/5/2017 10:36 AM</a:t>
+              <a:t>10/8/2017 6:04 PM</a:t>
             </a:fld>
             <a:endParaRPr lang="en-US" dirty="0"/>
           </a:p>
@@ -2757,7 +2778,7 @@
           <a:p>
             <a:fld id="{38EEC551-8CDA-4EB6-89BB-2A86C9F091C8}" type="datetime8">
               <a:rPr lang="en-US" smtClean="0"/>
-              <a:t>10/5/2017 10:36 AM</a:t>
+              <a:t>10/8/2017 6:04 PM</a:t>
             </a:fld>
             <a:endParaRPr lang="en-US" dirty="0"/>
           </a:p>
@@ -2942,7 +2963,7 @@
           <a:p>
             <a:fld id="{38EEC551-8CDA-4EB6-89BB-2A86C9F091C8}" type="datetime8">
               <a:rPr lang="en-US" smtClean="0"/>
-              <a:t>10/5/2017 10:36 AM</a:t>
+              <a:t>10/8/2017 6:04 PM</a:t>
             </a:fld>
             <a:endParaRPr lang="en-US" dirty="0"/>
           </a:p>
@@ -3127,7 +3148,7 @@
           <a:p>
             <a:fld id="{38EEC551-8CDA-4EB6-89BB-2A86C9F091C8}" type="datetime8">
               <a:rPr lang="en-US" smtClean="0"/>
-              <a:t>10/5/2017 10:36 AM</a:t>
+              <a:t>10/8/2017 6:04 PM</a:t>
             </a:fld>
             <a:endParaRPr lang="en-US" dirty="0"/>
           </a:p>
@@ -3312,7 +3333,7 @@
           <a:p>
             <a:fld id="{38EEC551-8CDA-4EB6-89BB-2A86C9F091C8}" type="datetime8">
               <a:rPr lang="en-US" smtClean="0"/>
-              <a:t>10/5/2017 10:44 AM</a:t>
+              <a:t>10/8/2017 6:04 PM</a:t>
             </a:fld>
             <a:endParaRPr lang="en-US" dirty="0"/>
           </a:p>
@@ -3345,7 +3366,7 @@
     </p:spTree>
     <p:extLst>
       <p:ext uri="{BB962C8B-B14F-4D97-AF65-F5344CB8AC3E}">
-        <p14:creationId xmlns:p14="http://schemas.microsoft.com/office/powerpoint/2010/main" val="3320354392"/>
+        <p14:creationId xmlns:p14="http://schemas.microsoft.com/office/powerpoint/2010/main" val="312457560"/>
       </p:ext>
     </p:extLst>
   </p:cSld>
@@ -3497,7 +3518,7 @@
           <a:p>
             <a:fld id="{38EEC551-8CDA-4EB6-89BB-2A86C9F091C8}" type="datetime8">
               <a:rPr lang="en-US" smtClean="0"/>
-              <a:t>10/5/2017 10:41 AM</a:t>
+              <a:t>10/8/2017 6:04 PM</a:t>
             </a:fld>
             <a:endParaRPr lang="en-US" dirty="0"/>
           </a:p>
@@ -3530,7 +3551,7 @@
     </p:spTree>
     <p:extLst>
       <p:ext uri="{BB962C8B-B14F-4D97-AF65-F5344CB8AC3E}">
-        <p14:creationId xmlns:p14="http://schemas.microsoft.com/office/powerpoint/2010/main" val="312457560"/>
+        <p14:creationId xmlns:p14="http://schemas.microsoft.com/office/powerpoint/2010/main" val="3320354392"/>
       </p:ext>
     </p:extLst>
   </p:cSld>
@@ -3682,7 +3703,7 @@
           <a:p>
             <a:fld id="{38EEC551-8CDA-4EB6-89BB-2A86C9F091C8}" type="datetime8">
               <a:rPr lang="en-US" smtClean="0"/>
-              <a:t>10/5/2017 10:36 AM</a:t>
+              <a:t>10/8/2017 6:04 PM</a:t>
             </a:fld>
             <a:endParaRPr lang="en-US" dirty="0"/>
           </a:p>
@@ -3867,7 +3888,7 @@
           <a:p>
             <a:fld id="{38EEC551-8CDA-4EB6-89BB-2A86C9F091C8}" type="datetime8">
               <a:rPr lang="en-US" smtClean="0"/>
-              <a:t>10/5/2017 8:59 AM</a:t>
+              <a:t>10/8/2017 6:04 PM</a:t>
             </a:fld>
             <a:endParaRPr lang="en-US" dirty="0"/>
           </a:p>
@@ -4052,7 +4073,7 @@
           <a:p>
             <a:fld id="{38EEC551-8CDA-4EB6-89BB-2A86C9F091C8}" type="datetime8">
               <a:rPr lang="en-US" smtClean="0"/>
-              <a:t>10/5/2017 10:36 AM</a:t>
+              <a:t>10/8/2017 6:04 PM</a:t>
             </a:fld>
             <a:endParaRPr lang="en-US" dirty="0"/>
           </a:p>
@@ -4237,7 +4258,7 @@
           <a:p>
             <a:fld id="{38EEC551-8CDA-4EB6-89BB-2A86C9F091C8}" type="datetime8">
               <a:rPr lang="en-US" smtClean="0"/>
-              <a:t>10/5/2017 9:26 AM</a:t>
+              <a:t>10/8/2017 6:04 PM</a:t>
             </a:fld>
             <a:endParaRPr lang="en-US" dirty="0"/>
           </a:p>
@@ -4422,7 +4443,7 @@
           <a:p>
             <a:fld id="{38EEC551-8CDA-4EB6-89BB-2A86C9F091C8}" type="datetime8">
               <a:rPr lang="en-US" smtClean="0"/>
-              <a:t>10/5/2017 9:26 AM</a:t>
+              <a:t>10/8/2017 6:04 PM</a:t>
             </a:fld>
             <a:endParaRPr lang="en-US" dirty="0"/>
           </a:p>
@@ -21016,111 +21037,6 @@
       </p:grpSpPr>
       <p:sp>
         <p:nvSpPr>
-          <p:cNvPr id="2" name="Title 1">
-            <a:extLst>
-              <a:ext uri="{FF2B5EF4-FFF2-40B4-BE49-F238E27FC236}">
-                <a16:creationId xmlns:a16="http://schemas.microsoft.com/office/drawing/2014/main" id="{30E59D95-E7A1-4EDB-B2D8-7701C89C8440}"/>
-              </a:ext>
-            </a:extLst>
-          </p:cNvPr>
-          <p:cNvSpPr>
-            <a:spLocks noGrp="1"/>
-          </p:cNvSpPr>
-          <p:nvPr>
-            <p:ph type="title"/>
-          </p:nvPr>
-        </p:nvSpPr>
-        <p:spPr>
-          <a:xfrm>
-            <a:off x="274638" y="2125677"/>
-            <a:ext cx="10056812" cy="2179058"/>
-          </a:xfrm>
-        </p:spPr>
-        <p:txBody>
-          <a:bodyPr/>
-          <a:lstStyle/>
-          <a:p>
-            <a:r>
-              <a:rPr lang="en-US" dirty="0"/>
-              <a:t>Configuration, Logging, Environments</a:t>
-            </a:r>
-          </a:p>
-        </p:txBody>
-      </p:sp>
-      <p:sp>
-        <p:nvSpPr>
-          <p:cNvPr id="3" name="Text Placeholder 2">
-            <a:extLst>
-              <a:ext uri="{FF2B5EF4-FFF2-40B4-BE49-F238E27FC236}">
-                <a16:creationId xmlns:a16="http://schemas.microsoft.com/office/drawing/2014/main" id="{70BF760B-108C-4C66-8E55-2DDBF992BC6D}"/>
-              </a:ext>
-            </a:extLst>
-          </p:cNvPr>
-          <p:cNvSpPr>
-            <a:spLocks noGrp="1"/>
-          </p:cNvSpPr>
-          <p:nvPr>
-            <p:ph type="body" sz="quarter" idx="12"/>
-          </p:nvPr>
-        </p:nvSpPr>
-        <p:spPr>
-          <a:xfrm>
-            <a:off x="273049" y="4296784"/>
-            <a:ext cx="10058401" cy="738664"/>
-          </a:xfrm>
-        </p:spPr>
-        <p:txBody>
-          <a:bodyPr/>
-          <a:lstStyle/>
-          <a:p>
-            <a:endParaRPr lang="en-US"/>
-          </a:p>
-        </p:txBody>
-      </p:sp>
-    </p:spTree>
-    <p:extLst>
-      <p:ext uri="{BB962C8B-B14F-4D97-AF65-F5344CB8AC3E}">
-        <p14:creationId xmlns:p14="http://schemas.microsoft.com/office/powerpoint/2010/main" val="2036594176"/>
-      </p:ext>
-    </p:extLst>
-  </p:cSld>
-  <p:clrMapOvr>
-    <a:masterClrMapping/>
-  </p:clrMapOvr>
-  <mc:AlternateContent xmlns:mc="http://schemas.openxmlformats.org/markup-compatibility/2006" xmlns:p14="http://schemas.microsoft.com/office/powerpoint/2010/main">
-    <mc:Choice Requires="p14">
-      <p:transition spd="slow" p14:dur="3400">
-        <p14:reveal/>
-      </p:transition>
-    </mc:Choice>
-    <mc:Fallback xmlns="">
-      <p:transition spd="slow">
-        <p:fade/>
-      </p:transition>
-    </mc:Fallback>
-  </mc:AlternateContent>
-</p:sld>
-</file>
-
-<file path=ppt/slides/slide22.xml><?xml version="1.0" encoding="utf-8"?>
-<p:sld xmlns:a="http://schemas.openxmlformats.org/drawingml/2006/main" xmlns:r="http://schemas.openxmlformats.org/officeDocument/2006/relationships" xmlns:p="http://schemas.openxmlformats.org/presentationml/2006/main">
-  <p:cSld>
-    <p:spTree>
-      <p:nvGrpSpPr>
-        <p:cNvPr id="1" name=""/>
-        <p:cNvGrpSpPr/>
-        <p:nvPr/>
-      </p:nvGrpSpPr>
-      <p:grpSpPr>
-        <a:xfrm>
-          <a:off x="0" y="0"/>
-          <a:ext cx="0" cy="0"/>
-          <a:chOff x="0" y="0"/>
-          <a:chExt cx="0" cy="0"/>
-        </a:xfrm>
-      </p:grpSpPr>
-      <p:sp>
-        <p:nvSpPr>
           <p:cNvPr id="2" name="Title 1"/>
           <p:cNvSpPr>
             <a:spLocks noGrp="1"/>
@@ -21894,6 +21810,111 @@
   <p:transition>
     <p:fade/>
   </p:transition>
+</p:sld>
+</file>
+
+<file path=ppt/slides/slide22.xml><?xml version="1.0" encoding="utf-8"?>
+<p:sld xmlns:a="http://schemas.openxmlformats.org/drawingml/2006/main" xmlns:r="http://schemas.openxmlformats.org/officeDocument/2006/relationships" xmlns:p="http://schemas.openxmlformats.org/presentationml/2006/main">
+  <p:cSld>
+    <p:spTree>
+      <p:nvGrpSpPr>
+        <p:cNvPr id="1" name=""/>
+        <p:cNvGrpSpPr/>
+        <p:nvPr/>
+      </p:nvGrpSpPr>
+      <p:grpSpPr>
+        <a:xfrm>
+          <a:off x="0" y="0"/>
+          <a:ext cx="0" cy="0"/>
+          <a:chOff x="0" y="0"/>
+          <a:chExt cx="0" cy="0"/>
+        </a:xfrm>
+      </p:grpSpPr>
+      <p:sp>
+        <p:nvSpPr>
+          <p:cNvPr id="2" name="Title 1">
+            <a:extLst>
+              <a:ext uri="{FF2B5EF4-FFF2-40B4-BE49-F238E27FC236}">
+                <a16:creationId xmlns:a16="http://schemas.microsoft.com/office/drawing/2014/main" id="{30E59D95-E7A1-4EDB-B2D8-7701C89C8440}"/>
+              </a:ext>
+            </a:extLst>
+          </p:cNvPr>
+          <p:cNvSpPr>
+            <a:spLocks noGrp="1"/>
+          </p:cNvSpPr>
+          <p:nvPr>
+            <p:ph type="title"/>
+          </p:nvPr>
+        </p:nvSpPr>
+        <p:spPr>
+          <a:xfrm>
+            <a:off x="274638" y="2125677"/>
+            <a:ext cx="10056812" cy="2179058"/>
+          </a:xfrm>
+        </p:spPr>
+        <p:txBody>
+          <a:bodyPr/>
+          <a:lstStyle/>
+          <a:p>
+            <a:r>
+              <a:rPr lang="en-US" dirty="0"/>
+              <a:t>Configuration, Logging, Environments</a:t>
+            </a:r>
+          </a:p>
+        </p:txBody>
+      </p:sp>
+      <p:sp>
+        <p:nvSpPr>
+          <p:cNvPr id="3" name="Text Placeholder 2">
+            <a:extLst>
+              <a:ext uri="{FF2B5EF4-FFF2-40B4-BE49-F238E27FC236}">
+                <a16:creationId xmlns:a16="http://schemas.microsoft.com/office/drawing/2014/main" id="{70BF760B-108C-4C66-8E55-2DDBF992BC6D}"/>
+              </a:ext>
+            </a:extLst>
+          </p:cNvPr>
+          <p:cNvSpPr>
+            <a:spLocks noGrp="1"/>
+          </p:cNvSpPr>
+          <p:nvPr>
+            <p:ph type="body" sz="quarter" idx="12"/>
+          </p:nvPr>
+        </p:nvSpPr>
+        <p:spPr>
+          <a:xfrm>
+            <a:off x="273049" y="4296784"/>
+            <a:ext cx="10058401" cy="738664"/>
+          </a:xfrm>
+        </p:spPr>
+        <p:txBody>
+          <a:bodyPr/>
+          <a:lstStyle/>
+          <a:p>
+            <a:endParaRPr lang="en-US"/>
+          </a:p>
+        </p:txBody>
+      </p:sp>
+    </p:spTree>
+    <p:extLst>
+      <p:ext uri="{BB962C8B-B14F-4D97-AF65-F5344CB8AC3E}">
+        <p14:creationId xmlns:p14="http://schemas.microsoft.com/office/powerpoint/2010/main" val="2036594176"/>
+      </p:ext>
+    </p:extLst>
+  </p:cSld>
+  <p:clrMapOvr>
+    <a:masterClrMapping/>
+  </p:clrMapOvr>
+  <mc:AlternateContent xmlns:mc="http://schemas.openxmlformats.org/markup-compatibility/2006" xmlns:p14="http://schemas.microsoft.com/office/powerpoint/2010/main">
+    <mc:Choice Requires="p14">
+      <p:transition spd="slow" p14:dur="3400">
+        <p14:reveal/>
+      </p:transition>
+    </mc:Choice>
+    <mc:Fallback xmlns="">
+      <p:transition spd="slow">
+        <p:fade/>
+      </p:transition>
+    </mc:Fallback>
+  </mc:AlternateContent>
 </p:sld>
 </file>
 
@@ -28965,15 +28986,6 @@
 </file>
 
 <file path=customXml/item1.xml><?xml version="1.0" encoding="utf-8"?>
-<?mso-contentType ?>
-<FormTemplates xmlns="http://schemas.microsoft.com/sharepoint/v3/contenttype/forms">
-  <Display>DocumentLibraryForm</Display>
-  <Edit>DocumentLibraryForm</Edit>
-  <New>DocumentLibraryForm</New>
-</FormTemplates>
-</file>
-
-<file path=customXml/item2.xml><?xml version="1.0" encoding="utf-8"?>
 <ct:contentTypeSchema xmlns:ct="http://schemas.microsoft.com/office/2006/metadata/contentType" xmlns:ma="http://schemas.microsoft.com/office/2006/metadata/properties/metaAttributes" ct:_="" ma:_="" ma:contentTypeName="Document" ma:contentTypeID="0x0101004C8AF336095DB84A94AB1A4B939C0475" ma:contentTypeVersion="4" ma:contentTypeDescription="Create a new document." ma:contentTypeScope="" ma:versionID="6f8327450122d2e4aedd139501eaa58b">
   <xsd:schema xmlns:xsd="http://www.w3.org/2001/XMLSchema" xmlns:xs="http://www.w3.org/2001/XMLSchema" xmlns:p="http://schemas.microsoft.com/office/2006/metadata/properties" xmlns:ns2="29eeffc7-3a1a-4f16-995c-1b7b58342919" targetNamespace="http://schemas.microsoft.com/office/2006/metadata/properties" ma:root="true" ma:fieldsID="7d6c3be25c216b690a82d24b3f2244b5" ns2:_="">
     <xsd:import namespace="29eeffc7-3a1a-4f16-995c-1b7b58342919"/>
@@ -29135,6 +29147,15 @@
 </ct:contentTypeSchema>
 </file>
 
+<file path=customXml/item2.xml><?xml version="1.0" encoding="utf-8"?>
+<?mso-contentType ?>
+<FormTemplates xmlns="http://schemas.microsoft.com/sharepoint/v3/contenttype/forms">
+  <Display>DocumentLibraryForm</Display>
+  <Edit>DocumentLibraryForm</Edit>
+  <New>DocumentLibraryForm</New>
+</FormTemplates>
+</file>
+
 <file path=customXml/item3.xml><?xml version="1.0" encoding="utf-8"?>
 <p:properties xmlns:p="http://schemas.microsoft.com/office/2006/metadata/properties" xmlns:xsi="http://www.w3.org/2001/XMLSchema-instance" xmlns:pc="http://schemas.microsoft.com/office/infopath/2007/PartnerControls">
   <documentManagement/>
@@ -29142,14 +29163,6 @@
 </file>
 
 <file path=customXml/itemProps1.xml><?xml version="1.0" encoding="utf-8"?>
-<ds:datastoreItem xmlns:ds="http://schemas.openxmlformats.org/officeDocument/2006/customXml" ds:itemID="{758FDAC0-319D-4A54-8D8E-1D42CB1F8004}">
-  <ds:schemaRefs>
-    <ds:schemaRef ds:uri="http://schemas.microsoft.com/sharepoint/v3/contenttype/forms"/>
-  </ds:schemaRefs>
-</ds:datastoreItem>
-</file>
-
-<file path=customXml/itemProps2.xml><?xml version="1.0" encoding="utf-8"?>
 <ds:datastoreItem xmlns:ds="http://schemas.openxmlformats.org/officeDocument/2006/customXml" ds:itemID="{4C47C6CA-B255-4F53-A8A9-1A4E6D0653D8}">
   <ds:schemaRefs>
     <ds:schemaRef ds:uri="http://schemas.microsoft.com/office/2006/metadata/contentType"/>
@@ -29163,6 +29176,14 @@
     <ds:schemaRef ds:uri="http://purl.org/dc/elements/1.1/"/>
     <ds:schemaRef ds:uri="http://purl.org/dc/terms/"/>
     <ds:schemaRef ds:uri="http://schemas.microsoft.com/internal/obd"/>
+  </ds:schemaRefs>
+</ds:datastoreItem>
+</file>
+
+<file path=customXml/itemProps2.xml><?xml version="1.0" encoding="utf-8"?>
+<ds:datastoreItem xmlns:ds="http://schemas.openxmlformats.org/officeDocument/2006/customXml" ds:itemID="{758FDAC0-319D-4A54-8D8E-1D42CB1F8004}">
+  <ds:schemaRefs>
+    <ds:schemaRef ds:uri="http://schemas.microsoft.com/sharepoint/v3/contenttype/forms"/>
   </ds:schemaRefs>
 </ds:datastoreItem>
 </file>

</xml_diff>

<commit_message>
update for 2.1 CreateWebHostBuilder
</commit_message>
<xml_diff>
--- a/docs/2-ASP.NET-Core-and-Web-API/aspnetcore.pptx
+++ b/docs/2-ASP.NET-Core-and-Web-API/aspnetcore.pptx
@@ -287,7 +287,7 @@
               <a:rPr lang="en-US" smtClean="0">
                 <a:latin typeface="Segoe UI" pitchFamily="34" charset="0"/>
               </a:rPr>
-              <a:t>10/3/18 10:10 AM</a:t>
+              <a:t>10/9/18 9:43 AM</a:t>
             </a:fld>
             <a:endParaRPr lang="en-US" dirty="0">
               <a:latin typeface="Segoe UI" pitchFamily="34" charset="0"/>
@@ -568,7 +568,7 @@
           <a:p>
             <a:fld id="{38EEC551-8CDA-4EB6-89BB-2A86C9F091C8}" type="datetime8">
               <a:rPr lang="en-US" smtClean="0"/>
-              <a:t>10/3/18 10:10 AM</a:t>
+              <a:t>10/9/18 9:43 AM</a:t>
             </a:fld>
             <a:endParaRPr lang="en-US" dirty="0"/>
           </a:p>
@@ -985,7 +985,7 @@
           <a:p>
             <a:fld id="{38EEC551-8CDA-4EB6-89BB-2A86C9F091C8}" type="datetime8">
               <a:rPr lang="en-US" smtClean="0"/>
-              <a:t>10/3/18 10:10 AM</a:t>
+              <a:t>10/9/18 9:43 AM</a:t>
             </a:fld>
             <a:endParaRPr lang="en-US" dirty="0"/>
           </a:p>
@@ -1170,7 +1170,7 @@
           <a:p>
             <a:fld id="{38EEC551-8CDA-4EB6-89BB-2A86C9F091C8}" type="datetime8">
               <a:rPr lang="en-US" smtClean="0"/>
-              <a:t>10/3/18 10:10 AM</a:t>
+              <a:t>10/9/18 9:43 AM</a:t>
             </a:fld>
             <a:endParaRPr lang="en-US" dirty="0"/>
           </a:p>
@@ -1355,7 +1355,7 @@
           <a:p>
             <a:fld id="{38EEC551-8CDA-4EB6-89BB-2A86C9F091C8}" type="datetime8">
               <a:rPr lang="en-US" smtClean="0"/>
-              <a:t>10/3/18 10:10 AM</a:t>
+              <a:t>10/9/18 9:43 AM</a:t>
             </a:fld>
             <a:endParaRPr lang="en-US" dirty="0"/>
           </a:p>
@@ -1540,7 +1540,7 @@
           <a:p>
             <a:fld id="{38EEC551-8CDA-4EB6-89BB-2A86C9F091C8}" type="datetime8">
               <a:rPr lang="en-US" smtClean="0"/>
-              <a:t>10/3/18 10:10 AM</a:t>
+              <a:t>10/9/18 9:43 AM</a:t>
             </a:fld>
             <a:endParaRPr lang="en-US" dirty="0"/>
           </a:p>
@@ -1865,7 +1865,7 @@
           <a:p>
             <a:fld id="{38EEC551-8CDA-4EB6-89BB-2A86C9F091C8}" type="datetime8">
               <a:rPr lang="en-US" smtClean="0"/>
-              <a:t>10/3/18 10:10 AM</a:t>
+              <a:t>10/9/18 9:43 AM</a:t>
             </a:fld>
             <a:endParaRPr lang="en-US" dirty="0"/>
           </a:p>
@@ -2338,7 +2338,7 @@
           <a:p>
             <a:fld id="{38EEC551-8CDA-4EB6-89BB-2A86C9F091C8}" type="datetime8">
               <a:rPr lang="en-US" smtClean="0"/>
-              <a:t>10/3/18 10:10 AM</a:t>
+              <a:t>10/9/18 9:43 AM</a:t>
             </a:fld>
             <a:endParaRPr lang="en-US" dirty="0"/>
           </a:p>
@@ -2544,7 +2544,7 @@
           <a:p>
             <a:fld id="{38EEC551-8CDA-4EB6-89BB-2A86C9F091C8}" type="datetime8">
               <a:rPr lang="en-US" smtClean="0"/>
-              <a:t>10/3/18 10:10 AM</a:t>
+              <a:t>10/9/18 9:43 AM</a:t>
             </a:fld>
             <a:endParaRPr lang="en-US" dirty="0"/>
           </a:p>
@@ -2729,7 +2729,7 @@
           <a:p>
             <a:fld id="{38EEC551-8CDA-4EB6-89BB-2A86C9F091C8}" type="datetime8">
               <a:rPr lang="en-US" smtClean="0"/>
-              <a:t>10/3/18 10:10 AM</a:t>
+              <a:t>10/9/18 9:43 AM</a:t>
             </a:fld>
             <a:endParaRPr lang="en-US" dirty="0"/>
           </a:p>
@@ -2914,7 +2914,7 @@
           <a:p>
             <a:fld id="{38EEC551-8CDA-4EB6-89BB-2A86C9F091C8}" type="datetime8">
               <a:rPr lang="en-US" smtClean="0"/>
-              <a:t>10/3/18 10:10 AM</a:t>
+              <a:t>10/9/18 9:43 AM</a:t>
             </a:fld>
             <a:endParaRPr lang="en-US" dirty="0"/>
           </a:p>
@@ -3099,7 +3099,7 @@
           <a:p>
             <a:fld id="{38EEC551-8CDA-4EB6-89BB-2A86C9F091C8}" type="datetime8">
               <a:rPr lang="en-US" smtClean="0"/>
-              <a:t>10/3/18 10:10 AM</a:t>
+              <a:t>10/9/18 9:43 AM</a:t>
             </a:fld>
             <a:endParaRPr lang="en-US" dirty="0"/>
           </a:p>
@@ -3284,7 +3284,7 @@
           <a:p>
             <a:fld id="{38EEC551-8CDA-4EB6-89BB-2A86C9F091C8}" type="datetime8">
               <a:rPr lang="en-US" smtClean="0"/>
-              <a:t>10/3/18 10:10 AM</a:t>
+              <a:t>10/9/18 9:43 AM</a:t>
             </a:fld>
             <a:endParaRPr lang="en-US" dirty="0"/>
           </a:p>
@@ -3469,7 +3469,7 @@
           <a:p>
             <a:fld id="{38EEC551-8CDA-4EB6-89BB-2A86C9F091C8}" type="datetime8">
               <a:rPr lang="en-US" smtClean="0"/>
-              <a:t>10/3/18 10:10 AM</a:t>
+              <a:t>10/9/18 9:43 AM</a:t>
             </a:fld>
             <a:endParaRPr lang="en-US" dirty="0"/>
           </a:p>
@@ -3744,7 +3744,7 @@
           <a:p>
             <a:fld id="{38EEC551-8CDA-4EB6-89BB-2A86C9F091C8}" type="datetime8">
               <a:rPr lang="en-US" smtClean="0"/>
-              <a:t>10/3/18 10:10 AM</a:t>
+              <a:t>10/9/18 9:43 AM</a:t>
             </a:fld>
             <a:endParaRPr lang="en-US" dirty="0"/>
           </a:p>
@@ -3929,7 +3929,7 @@
           <a:p>
             <a:fld id="{38EEC551-8CDA-4EB6-89BB-2A86C9F091C8}" type="datetime8">
               <a:rPr lang="en-US" smtClean="0"/>
-              <a:t>10/3/18 10:10 AM</a:t>
+              <a:t>10/9/18 9:43 AM</a:t>
             </a:fld>
             <a:endParaRPr lang="en-US" dirty="0"/>
           </a:p>
@@ -4114,7 +4114,7 @@
           <a:p>
             <a:fld id="{38EEC551-8CDA-4EB6-89BB-2A86C9F091C8}" type="datetime8">
               <a:rPr lang="en-US" smtClean="0"/>
-              <a:t>10/3/18 10:10 AM</a:t>
+              <a:t>10/9/18 9:43 AM</a:t>
             </a:fld>
             <a:endParaRPr lang="en-US" dirty="0"/>
           </a:p>
@@ -4299,7 +4299,7 @@
           <a:p>
             <a:fld id="{38EEC551-8CDA-4EB6-89BB-2A86C9F091C8}" type="datetime8">
               <a:rPr lang="en-US" smtClean="0"/>
-              <a:t>10/3/18 10:10 AM</a:t>
+              <a:t>10/9/18 9:43 AM</a:t>
             </a:fld>
             <a:endParaRPr lang="en-US" dirty="0"/>
           </a:p>
@@ -4484,7 +4484,7 @@
           <a:p>
             <a:fld id="{38EEC551-8CDA-4EB6-89BB-2A86C9F091C8}" type="datetime8">
               <a:rPr lang="en-US" smtClean="0"/>
-              <a:t>10/3/18 10:10 AM</a:t>
+              <a:t>10/9/18 9:43 AM</a:t>
             </a:fld>
             <a:endParaRPr lang="en-US" dirty="0"/>
           </a:p>
@@ -4669,7 +4669,7 @@
           <a:p>
             <a:fld id="{38EEC551-8CDA-4EB6-89BB-2A86C9F091C8}" type="datetime8">
               <a:rPr lang="en-US" smtClean="0"/>
-              <a:t>10/3/18 10:10 AM</a:t>
+              <a:t>10/9/18 9:43 AM</a:t>
             </a:fld>
             <a:endParaRPr lang="en-US" dirty="0"/>
           </a:p>
@@ -23664,8 +23664,13 @@
             <a:pPr lvl="1"/>
             <a:r>
               <a:rPr lang="en-US" dirty="0"/>
-              <a:t>MVC, Razor Pages, Identity, SignalR (alpha release)</a:t>
-            </a:r>
+              <a:t>MVC, Razor Pages, Identity, </a:t>
+            </a:r>
+            <a:r>
+              <a:rPr lang="en-US" dirty="0" err="1"/>
+              <a:t>SignalR</a:t>
+            </a:r>
+            <a:endParaRPr lang="en-US" dirty="0"/>
           </a:p>
         </p:txBody>
       </p:sp>
@@ -29189,12 +29194,9 @@
 </file>
 
 <file path=customXml/item1.xml><?xml version="1.0" encoding="utf-8"?>
-<?mso-contentType ?>
-<FormTemplates xmlns="http://schemas.microsoft.com/sharepoint/v3/contenttype/forms">
-  <Display>DocumentLibraryForm</Display>
-  <Edit>DocumentLibraryForm</Edit>
-  <New>DocumentLibraryForm</New>
-</FormTemplates>
+<p:properties xmlns:p="http://schemas.microsoft.com/office/2006/metadata/properties" xmlns:xsi="http://www.w3.org/2001/XMLSchema-instance" xmlns:pc="http://schemas.microsoft.com/office/infopath/2007/PartnerControls">
+  <documentManagement/>
+</p:properties>
 </file>
 
 <file path=customXml/item2.xml><?xml version="1.0" encoding="utf-8"?>
@@ -29360,15 +29362,26 @@
 </file>
 
 <file path=customXml/item3.xml><?xml version="1.0" encoding="utf-8"?>
-<p:properties xmlns:p="http://schemas.microsoft.com/office/2006/metadata/properties" xmlns:xsi="http://www.w3.org/2001/XMLSchema-instance" xmlns:pc="http://schemas.microsoft.com/office/infopath/2007/PartnerControls">
-  <documentManagement/>
-</p:properties>
+<?mso-contentType ?>
+<FormTemplates xmlns="http://schemas.microsoft.com/sharepoint/v3/contenttype/forms">
+  <Display>DocumentLibraryForm</Display>
+  <Edit>DocumentLibraryForm</Edit>
+  <New>DocumentLibraryForm</New>
+</FormTemplates>
 </file>
 
 <file path=customXml/itemProps1.xml><?xml version="1.0" encoding="utf-8"?>
-<ds:datastoreItem xmlns:ds="http://schemas.openxmlformats.org/officeDocument/2006/customXml" ds:itemID="{758FDAC0-319D-4A54-8D8E-1D42CB1F8004}">
+<ds:datastoreItem xmlns:ds="http://schemas.openxmlformats.org/officeDocument/2006/customXml" ds:itemID="{F990F116-B58F-4255-B05B-DA3808E0E5C6}">
   <ds:schemaRefs>
-    <ds:schemaRef ds:uri="http://schemas.microsoft.com/sharepoint/v3/contenttype/forms"/>
+    <ds:schemaRef ds:uri="http://www.w3.org/XML/1998/namespace"/>
+    <ds:schemaRef ds:uri="http://purl.org/dc/terms/"/>
+    <ds:schemaRef ds:uri="http://schemas.openxmlformats.org/package/2006/metadata/core-properties"/>
+    <ds:schemaRef ds:uri="http://purl.org/dc/dcmitype/"/>
+    <ds:schemaRef ds:uri="http://schemas.microsoft.com/office/2006/documentManagement/types"/>
+    <ds:schemaRef ds:uri="29eeffc7-3a1a-4f16-995c-1b7b58342919"/>
+    <ds:schemaRef ds:uri="http://schemas.microsoft.com/office/infopath/2007/PartnerControls"/>
+    <ds:schemaRef ds:uri="http://schemas.microsoft.com/office/2006/metadata/properties"/>
+    <ds:schemaRef ds:uri="http://purl.org/dc/elements/1.1/"/>
   </ds:schemaRefs>
 </ds:datastoreItem>
 </file>
@@ -29392,17 +29405,9 @@
 </file>
 
 <file path=customXml/itemProps3.xml><?xml version="1.0" encoding="utf-8"?>
-<ds:datastoreItem xmlns:ds="http://schemas.openxmlformats.org/officeDocument/2006/customXml" ds:itemID="{F990F116-B58F-4255-B05B-DA3808E0E5C6}">
+<ds:datastoreItem xmlns:ds="http://schemas.openxmlformats.org/officeDocument/2006/customXml" ds:itemID="{758FDAC0-319D-4A54-8D8E-1D42CB1F8004}">
   <ds:schemaRefs>
-    <ds:schemaRef ds:uri="http://www.w3.org/XML/1998/namespace"/>
-    <ds:schemaRef ds:uri="http://purl.org/dc/terms/"/>
-    <ds:schemaRef ds:uri="http://schemas.openxmlformats.org/package/2006/metadata/core-properties"/>
-    <ds:schemaRef ds:uri="http://purl.org/dc/dcmitype/"/>
-    <ds:schemaRef ds:uri="http://schemas.microsoft.com/office/2006/documentManagement/types"/>
-    <ds:schemaRef ds:uri="29eeffc7-3a1a-4f16-995c-1b7b58342919"/>
-    <ds:schemaRef ds:uri="http://schemas.microsoft.com/office/infopath/2007/PartnerControls"/>
-    <ds:schemaRef ds:uri="http://schemas.microsoft.com/office/2006/metadata/properties"/>
-    <ds:schemaRef ds:uri="http://purl.org/dc/elements/1.1/"/>
+    <ds:schemaRef ds:uri="http://schemas.microsoft.com/sharepoint/v3/contenttype/forms"/>
   </ds:schemaRefs>
 </ds:datastoreItem>
 </file>
</xml_diff>